<commit_message>
chore: automation for 590e096c8a30ee4a1900efd7425420d417cc2a15
</commit_message>
<xml_diff>
--- a/docs/pptx/calling.pptx
+++ b/docs/pptx/calling.pptx
@@ -208,7 +208,7 @@
           <a:p>
             <a:fld id="{7318B7AC-B73E-4152-A18A-FCB653AC65FB}" type="datetimeFigureOut">
               <a:rPr lang="ko-KR" altLang="en-US" smtClean="0"/>
-              <a:t>2022-04-12</a:t>
+              <a:t>2026. 2. 9.</a:t>
             </a:fld>
             <a:endParaRPr lang="ko-KR" altLang="en-US"/>
           </a:p>
@@ -2636,7 +2636,7 @@
           <a:p>
             <a:fld id="{AE9940A0-3E67-4FB7-BA7E-EAF0C0E0891D}" type="datetimeFigureOut">
               <a:rPr lang="ko-KR" altLang="en-US" smtClean="0"/>
-              <a:t>2022-04-12</a:t>
+              <a:t>2026. 2. 9.</a:t>
             </a:fld>
             <a:endParaRPr lang="ko-KR" altLang="en-US"/>
           </a:p>
@@ -3026,646 +3026,6 @@
           </a:p>
         </p:txBody>
       </p:sp>
-      <p:graphicFrame>
-        <p:nvGraphicFramePr>
-          <p:cNvPr id="2" name="Object 1">
-            <a:hlinkClick r:id="" action="ppaction://ole?verb=0"/>
-            <a:extLst>
-              <a:ext uri="{FF2B5EF4-FFF2-40B4-BE49-F238E27FC236}">
-                <a16:creationId xmlns:a16="http://schemas.microsoft.com/office/drawing/2014/main" id="{0416D544-FD60-4AA8-BBC6-B4793C8C6B56}"/>
-              </a:ext>
-            </a:extLst>
-          </p:cNvPr>
-          <p:cNvGraphicFramePr>
-            <a:graphicFrameLocks noChangeAspect="1"/>
-          </p:cNvGraphicFramePr>
-          <p:nvPr>
-            <p:extLst>
-              <p:ext uri="{D42A27DB-BD31-4B8C-83A1-F6EECF244321}">
-                <p14:modId xmlns:p14="http://schemas.microsoft.com/office/powerpoint/2010/main" val="1430347399"/>
-              </p:ext>
-            </p:extLst>
-          </p:nvPr>
-        </p:nvGraphicFramePr>
-        <p:xfrm>
-          <a:off x="1770063" y="928688"/>
-          <a:ext cx="6096000" cy="3429000"/>
-        </p:xfrm>
-        <a:graphic>
-          <a:graphicData uri="http://schemas.openxmlformats.org/presentationml/2006/ole">
-            <mc:AlternateContent xmlns:mc="http://schemas.openxmlformats.org/markup-compatibility/2006">
-              <mc:Choice xmlns:v="urn:schemas-microsoft-com:vml" Requires="v">
-                <p:oleObj spid="_x0000_s1056" name="Presentation" r:id="rId4" imgW="6096296" imgH="3429229" progId="PowerPoint.Show.12">
-                  <p:embed/>
-                </p:oleObj>
-              </mc:Choice>
-              <mc:Fallback>
-                <p:oleObj name="Presentation" r:id="rId4" imgW="6096296" imgH="3429229" progId="PowerPoint.Show.12">
-                  <p:embed/>
-                  <p:pic>
-                    <p:nvPicPr>
-                      <p:cNvPr id="0" name=""/>
-                      <p:cNvPicPr/>
-                      <p:nvPr/>
-                    </p:nvPicPr>
-                    <p:blipFill>
-                      <a:blip r:embed="rId5"/>
-                      <a:stretch>
-                        <a:fillRect/>
-                      </a:stretch>
-                    </p:blipFill>
-                    <p:spPr>
-                      <a:xfrm>
-                        <a:off x="1770063" y="928688"/>
-                        <a:ext cx="6096000" cy="3429000"/>
-                      </a:xfrm>
-                      <a:prstGeom prst="rect">
-                        <a:avLst/>
-                      </a:prstGeom>
-                    </p:spPr>
-                  </p:pic>
-                </p:oleObj>
-              </mc:Fallback>
-            </mc:AlternateContent>
-          </a:graphicData>
-        </a:graphic>
-      </p:graphicFrame>
-      <p:graphicFrame>
-        <p:nvGraphicFramePr>
-          <p:cNvPr id="3" name="Object 2">
-            <a:hlinkClick r:id="" action="ppaction://ole?verb=0"/>
-            <a:extLst>
-              <a:ext uri="{FF2B5EF4-FFF2-40B4-BE49-F238E27FC236}">
-                <a16:creationId xmlns:a16="http://schemas.microsoft.com/office/drawing/2014/main" id="{3E7851C1-11FF-4B6C-9243-520C55795C79}"/>
-              </a:ext>
-            </a:extLst>
-          </p:cNvPr>
-          <p:cNvGraphicFramePr>
-            <a:graphicFrameLocks noChangeAspect="1"/>
-          </p:cNvGraphicFramePr>
-          <p:nvPr>
-            <p:extLst>
-              <p:ext uri="{D42A27DB-BD31-4B8C-83A1-F6EECF244321}">
-                <p14:modId xmlns:p14="http://schemas.microsoft.com/office/powerpoint/2010/main" val="4019108907"/>
-              </p:ext>
-            </p:extLst>
-          </p:nvPr>
-        </p:nvGraphicFramePr>
-        <p:xfrm>
-          <a:off x="1868488" y="1027113"/>
-          <a:ext cx="6096000" cy="3429000"/>
-        </p:xfrm>
-        <a:graphic>
-          <a:graphicData uri="http://schemas.openxmlformats.org/presentationml/2006/ole">
-            <mc:AlternateContent xmlns:mc="http://schemas.openxmlformats.org/markup-compatibility/2006">
-              <mc:Choice xmlns:v="urn:schemas-microsoft-com:vml" Requires="v">
-                <p:oleObj spid="_x0000_s1057" name="Presentation" r:id="rId6" imgW="6096296" imgH="3429229" progId="PowerPoint.Show.12">
-                  <p:embed/>
-                </p:oleObj>
-              </mc:Choice>
-              <mc:Fallback>
-                <p:oleObj name="Presentation" r:id="rId6" imgW="6096296" imgH="3429229" progId="PowerPoint.Show.12">
-                  <p:embed/>
-                  <p:pic>
-                    <p:nvPicPr>
-                      <p:cNvPr id="0" name=""/>
-                      <p:cNvPicPr/>
-                      <p:nvPr/>
-                    </p:nvPicPr>
-                    <p:blipFill>
-                      <a:blip r:embed="rId5"/>
-                      <a:stretch>
-                        <a:fillRect/>
-                      </a:stretch>
-                    </p:blipFill>
-                    <p:spPr>
-                      <a:xfrm>
-                        <a:off x="1868488" y="1027113"/>
-                        <a:ext cx="6096000" cy="3429000"/>
-                      </a:xfrm>
-                      <a:prstGeom prst="rect">
-                        <a:avLst/>
-                      </a:prstGeom>
-                    </p:spPr>
-                  </p:pic>
-                </p:oleObj>
-              </mc:Fallback>
-            </mc:AlternateContent>
-          </a:graphicData>
-        </a:graphic>
-      </p:graphicFrame>
-      <p:graphicFrame>
-        <p:nvGraphicFramePr>
-          <p:cNvPr id="4" name="Object 3">
-            <a:hlinkClick r:id="" action="ppaction://ole?verb=0"/>
-            <a:extLst>
-              <a:ext uri="{FF2B5EF4-FFF2-40B4-BE49-F238E27FC236}">
-                <a16:creationId xmlns:a16="http://schemas.microsoft.com/office/drawing/2014/main" id="{8ECED44F-215A-40D3-A8A1-62D75261EAD3}"/>
-              </a:ext>
-            </a:extLst>
-          </p:cNvPr>
-          <p:cNvGraphicFramePr>
-            <a:graphicFrameLocks noChangeAspect="1"/>
-          </p:cNvGraphicFramePr>
-          <p:nvPr>
-            <p:extLst>
-              <p:ext uri="{D42A27DB-BD31-4B8C-83A1-F6EECF244321}">
-                <p14:modId xmlns:p14="http://schemas.microsoft.com/office/powerpoint/2010/main" val="1393570450"/>
-              </p:ext>
-            </p:extLst>
-          </p:nvPr>
-        </p:nvGraphicFramePr>
-        <p:xfrm>
-          <a:off x="1966913" y="1125538"/>
-          <a:ext cx="6096000" cy="3429000"/>
-        </p:xfrm>
-        <a:graphic>
-          <a:graphicData uri="http://schemas.openxmlformats.org/presentationml/2006/ole">
-            <mc:AlternateContent xmlns:mc="http://schemas.openxmlformats.org/markup-compatibility/2006">
-              <mc:Choice xmlns:v="urn:schemas-microsoft-com:vml" Requires="v">
-                <p:oleObj spid="_x0000_s1058" name="Presentation" r:id="rId7" imgW="6096296" imgH="3429229" progId="PowerPoint.Show.12">
-                  <p:embed/>
-                </p:oleObj>
-              </mc:Choice>
-              <mc:Fallback>
-                <p:oleObj name="Presentation" r:id="rId7" imgW="6096296" imgH="3429229" progId="PowerPoint.Show.12">
-                  <p:embed/>
-                  <p:pic>
-                    <p:nvPicPr>
-                      <p:cNvPr id="0" name=""/>
-                      <p:cNvPicPr/>
-                      <p:nvPr/>
-                    </p:nvPicPr>
-                    <p:blipFill>
-                      <a:blip r:embed="rId5"/>
-                      <a:stretch>
-                        <a:fillRect/>
-                      </a:stretch>
-                    </p:blipFill>
-                    <p:spPr>
-                      <a:xfrm>
-                        <a:off x="1966913" y="1125538"/>
-                        <a:ext cx="6096000" cy="3429000"/>
-                      </a:xfrm>
-                      <a:prstGeom prst="rect">
-                        <a:avLst/>
-                      </a:prstGeom>
-                    </p:spPr>
-                  </p:pic>
-                </p:oleObj>
-              </mc:Fallback>
-            </mc:AlternateContent>
-          </a:graphicData>
-        </a:graphic>
-      </p:graphicFrame>
-      <p:graphicFrame>
-        <p:nvGraphicFramePr>
-          <p:cNvPr id="6" name="Object 5">
-            <a:hlinkClick r:id="" action="ppaction://ole?verb=0"/>
-            <a:extLst>
-              <a:ext uri="{FF2B5EF4-FFF2-40B4-BE49-F238E27FC236}">
-                <a16:creationId xmlns:a16="http://schemas.microsoft.com/office/drawing/2014/main" id="{0AFB176A-7AC3-46C1-8D88-E0B072D1AC10}"/>
-              </a:ext>
-            </a:extLst>
-          </p:cNvPr>
-          <p:cNvGraphicFramePr>
-            <a:graphicFrameLocks noChangeAspect="1"/>
-          </p:cNvGraphicFramePr>
-          <p:nvPr>
-            <p:extLst>
-              <p:ext uri="{D42A27DB-BD31-4B8C-83A1-F6EECF244321}">
-                <p14:modId xmlns:p14="http://schemas.microsoft.com/office/powerpoint/2010/main" val="853424283"/>
-              </p:ext>
-            </p:extLst>
-          </p:nvPr>
-        </p:nvGraphicFramePr>
-        <p:xfrm>
-          <a:off x="2065338" y="1223963"/>
-          <a:ext cx="6096000" cy="3429000"/>
-        </p:xfrm>
-        <a:graphic>
-          <a:graphicData uri="http://schemas.openxmlformats.org/presentationml/2006/ole">
-            <mc:AlternateContent xmlns:mc="http://schemas.openxmlformats.org/markup-compatibility/2006">
-              <mc:Choice xmlns:v="urn:schemas-microsoft-com:vml" Requires="v">
-                <p:oleObj spid="_x0000_s1059" name="Presentation" r:id="rId8" imgW="6096296" imgH="3429229" progId="PowerPoint.Show.12">
-                  <p:embed/>
-                </p:oleObj>
-              </mc:Choice>
-              <mc:Fallback>
-                <p:oleObj name="Presentation" r:id="rId8" imgW="6096296" imgH="3429229" progId="PowerPoint.Show.12">
-                  <p:embed/>
-                  <p:pic>
-                    <p:nvPicPr>
-                      <p:cNvPr id="0" name=""/>
-                      <p:cNvPicPr/>
-                      <p:nvPr/>
-                    </p:nvPicPr>
-                    <p:blipFill>
-                      <a:blip r:embed="rId5"/>
-                      <a:stretch>
-                        <a:fillRect/>
-                      </a:stretch>
-                    </p:blipFill>
-                    <p:spPr>
-                      <a:xfrm>
-                        <a:off x="2065338" y="1223963"/>
-                        <a:ext cx="6096000" cy="3429000"/>
-                      </a:xfrm>
-                      <a:prstGeom prst="rect">
-                        <a:avLst/>
-                      </a:prstGeom>
-                    </p:spPr>
-                  </p:pic>
-                </p:oleObj>
-              </mc:Fallback>
-            </mc:AlternateContent>
-          </a:graphicData>
-        </a:graphic>
-      </p:graphicFrame>
-      <p:graphicFrame>
-        <p:nvGraphicFramePr>
-          <p:cNvPr id="7" name="Object 6">
-            <a:hlinkClick r:id="" action="ppaction://ole?verb=0"/>
-            <a:extLst>
-              <a:ext uri="{FF2B5EF4-FFF2-40B4-BE49-F238E27FC236}">
-                <a16:creationId xmlns:a16="http://schemas.microsoft.com/office/drawing/2014/main" id="{608D6AFA-5E44-4C6B-9D8D-B5874858BBBA}"/>
-              </a:ext>
-            </a:extLst>
-          </p:cNvPr>
-          <p:cNvGraphicFramePr>
-            <a:graphicFrameLocks noChangeAspect="1"/>
-          </p:cNvGraphicFramePr>
-          <p:nvPr>
-            <p:extLst>
-              <p:ext uri="{D42A27DB-BD31-4B8C-83A1-F6EECF244321}">
-                <p14:modId xmlns:p14="http://schemas.microsoft.com/office/powerpoint/2010/main" val="2236269608"/>
-              </p:ext>
-            </p:extLst>
-          </p:nvPr>
-        </p:nvGraphicFramePr>
-        <p:xfrm>
-          <a:off x="2163763" y="1322388"/>
-          <a:ext cx="6096000" cy="3429000"/>
-        </p:xfrm>
-        <a:graphic>
-          <a:graphicData uri="http://schemas.openxmlformats.org/presentationml/2006/ole">
-            <mc:AlternateContent xmlns:mc="http://schemas.openxmlformats.org/markup-compatibility/2006">
-              <mc:Choice xmlns:v="urn:schemas-microsoft-com:vml" Requires="v">
-                <p:oleObj spid="_x0000_s1060" name="Presentation" r:id="rId9" imgW="6096296" imgH="3429229" progId="PowerPoint.Show.12">
-                  <p:embed/>
-                </p:oleObj>
-              </mc:Choice>
-              <mc:Fallback>
-                <p:oleObj name="Presentation" r:id="rId9" imgW="6096296" imgH="3429229" progId="PowerPoint.Show.12">
-                  <p:embed/>
-                  <p:pic>
-                    <p:nvPicPr>
-                      <p:cNvPr id="0" name=""/>
-                      <p:cNvPicPr/>
-                      <p:nvPr/>
-                    </p:nvPicPr>
-                    <p:blipFill>
-                      <a:blip r:embed="rId5"/>
-                      <a:stretch>
-                        <a:fillRect/>
-                      </a:stretch>
-                    </p:blipFill>
-                    <p:spPr>
-                      <a:xfrm>
-                        <a:off x="2163763" y="1322388"/>
-                        <a:ext cx="6096000" cy="3429000"/>
-                      </a:xfrm>
-                      <a:prstGeom prst="rect">
-                        <a:avLst/>
-                      </a:prstGeom>
-                    </p:spPr>
-                  </p:pic>
-                </p:oleObj>
-              </mc:Fallback>
-            </mc:AlternateContent>
-          </a:graphicData>
-        </a:graphic>
-      </p:graphicFrame>
-      <p:graphicFrame>
-        <p:nvGraphicFramePr>
-          <p:cNvPr id="8" name="Object 7">
-            <a:hlinkClick r:id="" action="ppaction://ole?verb=0"/>
-            <a:extLst>
-              <a:ext uri="{FF2B5EF4-FFF2-40B4-BE49-F238E27FC236}">
-                <a16:creationId xmlns:a16="http://schemas.microsoft.com/office/drawing/2014/main" id="{F8615C99-1DB7-41AE-87CC-A21D4B59A0FD}"/>
-              </a:ext>
-            </a:extLst>
-          </p:cNvPr>
-          <p:cNvGraphicFramePr>
-            <a:graphicFrameLocks noChangeAspect="1"/>
-          </p:cNvGraphicFramePr>
-          <p:nvPr>
-            <p:extLst>
-              <p:ext uri="{D42A27DB-BD31-4B8C-83A1-F6EECF244321}">
-                <p14:modId xmlns:p14="http://schemas.microsoft.com/office/powerpoint/2010/main" val="453137178"/>
-              </p:ext>
-            </p:extLst>
-          </p:nvPr>
-        </p:nvGraphicFramePr>
-        <p:xfrm>
-          <a:off x="2262188" y="1420813"/>
-          <a:ext cx="6096000" cy="3429000"/>
-        </p:xfrm>
-        <a:graphic>
-          <a:graphicData uri="http://schemas.openxmlformats.org/presentationml/2006/ole">
-            <mc:AlternateContent xmlns:mc="http://schemas.openxmlformats.org/markup-compatibility/2006">
-              <mc:Choice xmlns:v="urn:schemas-microsoft-com:vml" Requires="v">
-                <p:oleObj spid="_x0000_s1061" name="Presentation" r:id="rId10" imgW="6096296" imgH="3429229" progId="PowerPoint.Show.12">
-                  <p:embed/>
-                </p:oleObj>
-              </mc:Choice>
-              <mc:Fallback>
-                <p:oleObj name="Presentation" r:id="rId10" imgW="6096296" imgH="3429229" progId="PowerPoint.Show.12">
-                  <p:embed/>
-                  <p:pic>
-                    <p:nvPicPr>
-                      <p:cNvPr id="0" name=""/>
-                      <p:cNvPicPr/>
-                      <p:nvPr/>
-                    </p:nvPicPr>
-                    <p:blipFill>
-                      <a:blip r:embed="rId5"/>
-                      <a:stretch>
-                        <a:fillRect/>
-                      </a:stretch>
-                    </p:blipFill>
-                    <p:spPr>
-                      <a:xfrm>
-                        <a:off x="2262188" y="1420813"/>
-                        <a:ext cx="6096000" cy="3429000"/>
-                      </a:xfrm>
-                      <a:prstGeom prst="rect">
-                        <a:avLst/>
-                      </a:prstGeom>
-                    </p:spPr>
-                  </p:pic>
-                </p:oleObj>
-              </mc:Fallback>
-            </mc:AlternateContent>
-          </a:graphicData>
-        </a:graphic>
-      </p:graphicFrame>
-      <p:graphicFrame>
-        <p:nvGraphicFramePr>
-          <p:cNvPr id="9" name="Object 8">
-            <a:hlinkClick r:id="" action="ppaction://ole?verb=0"/>
-            <a:extLst>
-              <a:ext uri="{FF2B5EF4-FFF2-40B4-BE49-F238E27FC236}">
-                <a16:creationId xmlns:a16="http://schemas.microsoft.com/office/drawing/2014/main" id="{9BFD58A4-C468-4098-A41B-90D95FAB5C9D}"/>
-              </a:ext>
-            </a:extLst>
-          </p:cNvPr>
-          <p:cNvGraphicFramePr>
-            <a:graphicFrameLocks noChangeAspect="1"/>
-          </p:cNvGraphicFramePr>
-          <p:nvPr>
-            <p:extLst>
-              <p:ext uri="{D42A27DB-BD31-4B8C-83A1-F6EECF244321}">
-                <p14:modId xmlns:p14="http://schemas.microsoft.com/office/powerpoint/2010/main" val="2593847102"/>
-              </p:ext>
-            </p:extLst>
-          </p:nvPr>
-        </p:nvGraphicFramePr>
-        <p:xfrm>
-          <a:off x="2360613" y="1519238"/>
-          <a:ext cx="6096000" cy="3429000"/>
-        </p:xfrm>
-        <a:graphic>
-          <a:graphicData uri="http://schemas.openxmlformats.org/presentationml/2006/ole">
-            <mc:AlternateContent xmlns:mc="http://schemas.openxmlformats.org/markup-compatibility/2006">
-              <mc:Choice xmlns:v="urn:schemas-microsoft-com:vml" Requires="v">
-                <p:oleObj spid="_x0000_s1062" name="Presentation" r:id="rId11" imgW="6096296" imgH="3429229" progId="PowerPoint.Show.12">
-                  <p:embed/>
-                </p:oleObj>
-              </mc:Choice>
-              <mc:Fallback>
-                <p:oleObj name="Presentation" r:id="rId11" imgW="6096296" imgH="3429229" progId="PowerPoint.Show.12">
-                  <p:embed/>
-                  <p:pic>
-                    <p:nvPicPr>
-                      <p:cNvPr id="0" name=""/>
-                      <p:cNvPicPr/>
-                      <p:nvPr/>
-                    </p:nvPicPr>
-                    <p:blipFill>
-                      <a:blip r:embed="rId5"/>
-                      <a:stretch>
-                        <a:fillRect/>
-                      </a:stretch>
-                    </p:blipFill>
-                    <p:spPr>
-                      <a:xfrm>
-                        <a:off x="2360613" y="1519238"/>
-                        <a:ext cx="6096000" cy="3429000"/>
-                      </a:xfrm>
-                      <a:prstGeom prst="rect">
-                        <a:avLst/>
-                      </a:prstGeom>
-                    </p:spPr>
-                  </p:pic>
-                </p:oleObj>
-              </mc:Fallback>
-            </mc:AlternateContent>
-          </a:graphicData>
-        </a:graphic>
-      </p:graphicFrame>
-      <p:graphicFrame>
-        <p:nvGraphicFramePr>
-          <p:cNvPr id="10" name="Object 9">
-            <a:hlinkClick r:id="" action="ppaction://ole?verb=0"/>
-            <a:extLst>
-              <a:ext uri="{FF2B5EF4-FFF2-40B4-BE49-F238E27FC236}">
-                <a16:creationId xmlns:a16="http://schemas.microsoft.com/office/drawing/2014/main" id="{F9057508-6366-4D57-87C4-B2234C332CEF}"/>
-              </a:ext>
-            </a:extLst>
-          </p:cNvPr>
-          <p:cNvGraphicFramePr>
-            <a:graphicFrameLocks noChangeAspect="1"/>
-          </p:cNvGraphicFramePr>
-          <p:nvPr>
-            <p:extLst>
-              <p:ext uri="{D42A27DB-BD31-4B8C-83A1-F6EECF244321}">
-                <p14:modId xmlns:p14="http://schemas.microsoft.com/office/powerpoint/2010/main" val="3273076899"/>
-              </p:ext>
-            </p:extLst>
-          </p:nvPr>
-        </p:nvGraphicFramePr>
-        <p:xfrm>
-          <a:off x="2459038" y="1617663"/>
-          <a:ext cx="6096000" cy="3429000"/>
-        </p:xfrm>
-        <a:graphic>
-          <a:graphicData uri="http://schemas.openxmlformats.org/presentationml/2006/ole">
-            <mc:AlternateContent xmlns:mc="http://schemas.openxmlformats.org/markup-compatibility/2006">
-              <mc:Choice xmlns:v="urn:schemas-microsoft-com:vml" Requires="v">
-                <p:oleObj spid="_x0000_s1063" name="Presentation" r:id="rId12" imgW="6096296" imgH="3429229" progId="PowerPoint.Show.12">
-                  <p:embed/>
-                </p:oleObj>
-              </mc:Choice>
-              <mc:Fallback>
-                <p:oleObj name="Presentation" r:id="rId12" imgW="6096296" imgH="3429229" progId="PowerPoint.Show.12">
-                  <p:embed/>
-                  <p:pic>
-                    <p:nvPicPr>
-                      <p:cNvPr id="0" name=""/>
-                      <p:cNvPicPr/>
-                      <p:nvPr/>
-                    </p:nvPicPr>
-                    <p:blipFill>
-                      <a:blip r:embed="rId5"/>
-                      <a:stretch>
-                        <a:fillRect/>
-                      </a:stretch>
-                    </p:blipFill>
-                    <p:spPr>
-                      <a:xfrm>
-                        <a:off x="2459038" y="1617663"/>
-                        <a:ext cx="6096000" cy="3429000"/>
-                      </a:xfrm>
-                      <a:prstGeom prst="rect">
-                        <a:avLst/>
-                      </a:prstGeom>
-                    </p:spPr>
-                  </p:pic>
-                </p:oleObj>
-              </mc:Fallback>
-            </mc:AlternateContent>
-          </a:graphicData>
-        </a:graphic>
-      </p:graphicFrame>
-      <p:graphicFrame>
-        <p:nvGraphicFramePr>
-          <p:cNvPr id="11" name="Object 10">
-            <a:hlinkClick r:id="" action="ppaction://ole?verb=0"/>
-            <a:extLst>
-              <a:ext uri="{FF2B5EF4-FFF2-40B4-BE49-F238E27FC236}">
-                <a16:creationId xmlns:a16="http://schemas.microsoft.com/office/drawing/2014/main" id="{B7A70763-7C32-46C7-A5EA-F40BEAD1189F}"/>
-              </a:ext>
-            </a:extLst>
-          </p:cNvPr>
-          <p:cNvGraphicFramePr>
-            <a:graphicFrameLocks noChangeAspect="1"/>
-          </p:cNvGraphicFramePr>
-          <p:nvPr>
-            <p:extLst>
-              <p:ext uri="{D42A27DB-BD31-4B8C-83A1-F6EECF244321}">
-                <p14:modId xmlns:p14="http://schemas.microsoft.com/office/powerpoint/2010/main" val="88903237"/>
-              </p:ext>
-            </p:extLst>
-          </p:nvPr>
-        </p:nvGraphicFramePr>
-        <p:xfrm>
-          <a:off x="2557463" y="1716088"/>
-          <a:ext cx="4572000" cy="2573337"/>
-        </p:xfrm>
-        <a:graphic>
-          <a:graphicData uri="http://schemas.openxmlformats.org/presentationml/2006/ole">
-            <mc:AlternateContent xmlns:mc="http://schemas.openxmlformats.org/markup-compatibility/2006">
-              <mc:Choice xmlns:v="urn:schemas-microsoft-com:vml" Requires="v">
-                <p:oleObj spid="_x0000_s1064" name="Presentation" r:id="rId13" imgW="4572042" imgH="2572643" progId="PowerPoint.Show.12">
-                  <p:embed/>
-                </p:oleObj>
-              </mc:Choice>
-              <mc:Fallback>
-                <p:oleObj name="Presentation" r:id="rId13" imgW="4572042" imgH="2572643" progId="PowerPoint.Show.12">
-                  <p:embed/>
-                  <p:pic>
-                    <p:nvPicPr>
-                      <p:cNvPr id="0" name=""/>
-                      <p:cNvPicPr/>
-                      <p:nvPr/>
-                    </p:nvPicPr>
-                    <p:blipFill>
-                      <a:blip r:embed="rId14"/>
-                      <a:stretch>
-                        <a:fillRect/>
-                      </a:stretch>
-                    </p:blipFill>
-                    <p:spPr>
-                      <a:xfrm>
-                        <a:off x="2557463" y="1716088"/>
-                        <a:ext cx="4572000" cy="2573337"/>
-                      </a:xfrm>
-                      <a:prstGeom prst="rect">
-                        <a:avLst/>
-                      </a:prstGeom>
-                    </p:spPr>
-                  </p:pic>
-                </p:oleObj>
-              </mc:Fallback>
-            </mc:AlternateContent>
-          </a:graphicData>
-        </a:graphic>
-      </p:graphicFrame>
-      <p:graphicFrame>
-        <p:nvGraphicFramePr>
-          <p:cNvPr id="12" name="Object 11">
-            <a:hlinkClick r:id="" action="ppaction://ole?verb=0"/>
-            <a:extLst>
-              <a:ext uri="{FF2B5EF4-FFF2-40B4-BE49-F238E27FC236}">
-                <a16:creationId xmlns:a16="http://schemas.microsoft.com/office/drawing/2014/main" id="{37291302-06CA-4D66-A43A-CA8E3871A3FE}"/>
-              </a:ext>
-            </a:extLst>
-          </p:cNvPr>
-          <p:cNvGraphicFramePr>
-            <a:graphicFrameLocks noChangeAspect="1"/>
-          </p:cNvGraphicFramePr>
-          <p:nvPr>
-            <p:extLst>
-              <p:ext uri="{D42A27DB-BD31-4B8C-83A1-F6EECF244321}">
-                <p14:modId xmlns:p14="http://schemas.microsoft.com/office/powerpoint/2010/main" val="644704035"/>
-              </p:ext>
-            </p:extLst>
-          </p:nvPr>
-        </p:nvGraphicFramePr>
-        <p:xfrm>
-          <a:off x="2655888" y="1814513"/>
-          <a:ext cx="6096000" cy="3429000"/>
-        </p:xfrm>
-        <a:graphic>
-          <a:graphicData uri="http://schemas.openxmlformats.org/presentationml/2006/ole">
-            <mc:AlternateContent xmlns:mc="http://schemas.openxmlformats.org/markup-compatibility/2006">
-              <mc:Choice xmlns:v="urn:schemas-microsoft-com:vml" Requires="v">
-                <p:oleObj spid="_x0000_s1065" name="Presentation" r:id="rId15" imgW="6096296" imgH="3429229" progId="PowerPoint.Show.12">
-                  <p:embed/>
-                </p:oleObj>
-              </mc:Choice>
-              <mc:Fallback>
-                <p:oleObj name="Presentation" r:id="rId15" imgW="6096296" imgH="3429229" progId="PowerPoint.Show.12">
-                  <p:embed/>
-                  <p:pic>
-                    <p:nvPicPr>
-                      <p:cNvPr id="0" name=""/>
-                      <p:cNvPicPr/>
-                      <p:nvPr/>
-                    </p:nvPicPr>
-                    <p:blipFill>
-                      <a:blip r:embed="rId5"/>
-                      <a:stretch>
-                        <a:fillRect/>
-                      </a:stretch>
-                    </p:blipFill>
-                    <p:spPr>
-                      <a:xfrm>
-                        <a:off x="2655888" y="1814513"/>
-                        <a:ext cx="6096000" cy="3429000"/>
-                      </a:xfrm>
-                      <a:prstGeom prst="rect">
-                        <a:avLst/>
-                      </a:prstGeom>
-                    </p:spPr>
-                  </p:pic>
-                </p:oleObj>
-              </mc:Fallback>
-            </mc:AlternateContent>
-          </a:graphicData>
-        </a:graphic>
-      </p:graphicFrame>
     </p:spTree>
   </p:cSld>
   <p:clrMapOvr>

</xml_diff>